<commit_message>
AD9910 spi module was updated & spi module is being writen
</commit_message>
<xml_diff>
--- a/ARTIQ_spi_module.pptx
+++ b/ARTIQ_spi_module.pptx
@@ -274,7 +274,7 @@
           <a:p>
             <a:fld id="{EC04517C-7144-4FE4-A64F-4FBA7D5E96ED}" type="datetimeFigureOut">
               <a:rPr lang="ko-KR" altLang="en-US" smtClean="0"/>
-              <a:t>2020-08-16</a:t>
+              <a:t>2020-08-17</a:t>
             </a:fld>
             <a:endParaRPr lang="ko-KR" altLang="en-US"/>
           </a:p>
@@ -472,7 +472,7 @@
           <a:p>
             <a:fld id="{EC04517C-7144-4FE4-A64F-4FBA7D5E96ED}" type="datetimeFigureOut">
               <a:rPr lang="ko-KR" altLang="en-US" smtClean="0"/>
-              <a:t>2020-08-16</a:t>
+              <a:t>2020-08-17</a:t>
             </a:fld>
             <a:endParaRPr lang="ko-KR" altLang="en-US"/>
           </a:p>
@@ -680,7 +680,7 @@
           <a:p>
             <a:fld id="{EC04517C-7144-4FE4-A64F-4FBA7D5E96ED}" type="datetimeFigureOut">
               <a:rPr lang="ko-KR" altLang="en-US" smtClean="0"/>
-              <a:t>2020-08-16</a:t>
+              <a:t>2020-08-17</a:t>
             </a:fld>
             <a:endParaRPr lang="ko-KR" altLang="en-US"/>
           </a:p>
@@ -878,7 +878,7 @@
           <a:p>
             <a:fld id="{EC04517C-7144-4FE4-A64F-4FBA7D5E96ED}" type="datetimeFigureOut">
               <a:rPr lang="ko-KR" altLang="en-US" smtClean="0"/>
-              <a:t>2020-08-16</a:t>
+              <a:t>2020-08-17</a:t>
             </a:fld>
             <a:endParaRPr lang="ko-KR" altLang="en-US"/>
           </a:p>
@@ -1153,7 +1153,7 @@
           <a:p>
             <a:fld id="{EC04517C-7144-4FE4-A64F-4FBA7D5E96ED}" type="datetimeFigureOut">
               <a:rPr lang="ko-KR" altLang="en-US" smtClean="0"/>
-              <a:t>2020-08-16</a:t>
+              <a:t>2020-08-17</a:t>
             </a:fld>
             <a:endParaRPr lang="ko-KR" altLang="en-US"/>
           </a:p>
@@ -1418,7 +1418,7 @@
           <a:p>
             <a:fld id="{EC04517C-7144-4FE4-A64F-4FBA7D5E96ED}" type="datetimeFigureOut">
               <a:rPr lang="ko-KR" altLang="en-US" smtClean="0"/>
-              <a:t>2020-08-16</a:t>
+              <a:t>2020-08-17</a:t>
             </a:fld>
             <a:endParaRPr lang="ko-KR" altLang="en-US"/>
           </a:p>
@@ -1830,7 +1830,7 @@
           <a:p>
             <a:fld id="{EC04517C-7144-4FE4-A64F-4FBA7D5E96ED}" type="datetimeFigureOut">
               <a:rPr lang="ko-KR" altLang="en-US" smtClean="0"/>
-              <a:t>2020-08-16</a:t>
+              <a:t>2020-08-17</a:t>
             </a:fld>
             <a:endParaRPr lang="ko-KR" altLang="en-US"/>
           </a:p>
@@ -1971,7 +1971,7 @@
           <a:p>
             <a:fld id="{EC04517C-7144-4FE4-A64F-4FBA7D5E96ED}" type="datetimeFigureOut">
               <a:rPr lang="ko-KR" altLang="en-US" smtClean="0"/>
-              <a:t>2020-08-16</a:t>
+              <a:t>2020-08-17</a:t>
             </a:fld>
             <a:endParaRPr lang="ko-KR" altLang="en-US"/>
           </a:p>
@@ -2084,7 +2084,7 @@
           <a:p>
             <a:fld id="{EC04517C-7144-4FE4-A64F-4FBA7D5E96ED}" type="datetimeFigureOut">
               <a:rPr lang="ko-KR" altLang="en-US" smtClean="0"/>
-              <a:t>2020-08-16</a:t>
+              <a:t>2020-08-17</a:t>
             </a:fld>
             <a:endParaRPr lang="ko-KR" altLang="en-US"/>
           </a:p>
@@ -2395,7 +2395,7 @@
           <a:p>
             <a:fld id="{EC04517C-7144-4FE4-A64F-4FBA7D5E96ED}" type="datetimeFigureOut">
               <a:rPr lang="ko-KR" altLang="en-US" smtClean="0"/>
-              <a:t>2020-08-16</a:t>
+              <a:t>2020-08-17</a:t>
             </a:fld>
             <a:endParaRPr lang="ko-KR" altLang="en-US"/>
           </a:p>
@@ -2683,7 +2683,7 @@
           <a:p>
             <a:fld id="{EC04517C-7144-4FE4-A64F-4FBA7D5E96ED}" type="datetimeFigureOut">
               <a:rPr lang="ko-KR" altLang="en-US" smtClean="0"/>
-              <a:t>2020-08-16</a:t>
+              <a:t>2020-08-17</a:t>
             </a:fld>
             <a:endParaRPr lang="ko-KR" altLang="en-US"/>
           </a:p>
@@ -2924,7 +2924,7 @@
           <a:p>
             <a:fld id="{EC04517C-7144-4FE4-A64F-4FBA7D5E96ED}" type="datetimeFigureOut">
               <a:rPr lang="ko-KR" altLang="en-US" smtClean="0"/>
-              <a:t>2020-08-16</a:t>
+              <a:t>2020-08-17</a:t>
             </a:fld>
             <a:endParaRPr lang="ko-KR" altLang="en-US"/>
           </a:p>
@@ -28378,56 +28378,6 @@
         </p:sp>
         <p:sp>
           <p:nvSpPr>
-            <p:cNvPr id="56" name="직사각형 55">
-              <a:extLst>
-                <a:ext uri="{FF2B5EF4-FFF2-40B4-BE49-F238E27FC236}">
-                  <a16:creationId xmlns:a16="http://schemas.microsoft.com/office/drawing/2014/main" id="{D4C0E58E-6C05-48B0-8491-B1D66D953E62}"/>
-                </a:ext>
-              </a:extLst>
-            </p:cNvPr>
-            <p:cNvSpPr/>
-            <p:nvPr/>
-          </p:nvSpPr>
-          <p:spPr>
-            <a:xfrm>
-              <a:off x="211613" y="5991826"/>
-              <a:ext cx="607602" cy="230512"/>
-            </a:xfrm>
-            <a:prstGeom prst="rect">
-              <a:avLst/>
-            </a:prstGeom>
-          </p:spPr>
-          <p:style>
-            <a:lnRef idx="2">
-              <a:schemeClr val="accent1">
-                <a:shade val="50000"/>
-              </a:schemeClr>
-            </a:lnRef>
-            <a:fillRef idx="1">
-              <a:schemeClr val="accent1"/>
-            </a:fillRef>
-            <a:effectRef idx="0">
-              <a:schemeClr val="accent1"/>
-            </a:effectRef>
-            <a:fontRef idx="minor">
-              <a:schemeClr val="lt1"/>
-            </a:fontRef>
-          </p:style>
-          <p:txBody>
-            <a:bodyPr rtlCol="0" anchor="ctr"/>
-            <a:lstStyle/>
-            <a:p>
-              <a:pPr algn="ctr"/>
-              <a:r>
-                <a:rPr lang="en-US" altLang="ko-KR" sz="900" dirty="0" err="1"/>
-                <a:t>sdo</a:t>
-              </a:r>
-              <a:endParaRPr lang="ko-KR" altLang="en-US" sz="900" dirty="0"/>
-            </a:p>
-          </p:txBody>
-        </p:sp>
-        <p:sp>
-          <p:nvSpPr>
             <p:cNvPr id="58" name="직사각형 57">
               <a:extLst>
                 <a:ext uri="{FF2B5EF4-FFF2-40B4-BE49-F238E27FC236}">
@@ -33265,56 +33215,6 @@
         </p:sp>
         <p:sp>
           <p:nvSpPr>
-            <p:cNvPr id="56" name="직사각형 55">
-              <a:extLst>
-                <a:ext uri="{FF2B5EF4-FFF2-40B4-BE49-F238E27FC236}">
-                  <a16:creationId xmlns:a16="http://schemas.microsoft.com/office/drawing/2014/main" id="{D4C0E58E-6C05-48B0-8491-B1D66D953E62}"/>
-                </a:ext>
-              </a:extLst>
-            </p:cNvPr>
-            <p:cNvSpPr/>
-            <p:nvPr/>
-          </p:nvSpPr>
-          <p:spPr>
-            <a:xfrm>
-              <a:off x="211613" y="5991826"/>
-              <a:ext cx="607602" cy="230512"/>
-            </a:xfrm>
-            <a:prstGeom prst="rect">
-              <a:avLst/>
-            </a:prstGeom>
-          </p:spPr>
-          <p:style>
-            <a:lnRef idx="2">
-              <a:schemeClr val="accent1">
-                <a:shade val="50000"/>
-              </a:schemeClr>
-            </a:lnRef>
-            <a:fillRef idx="1">
-              <a:schemeClr val="accent1"/>
-            </a:fillRef>
-            <a:effectRef idx="0">
-              <a:schemeClr val="accent1"/>
-            </a:effectRef>
-            <a:fontRef idx="minor">
-              <a:schemeClr val="lt1"/>
-            </a:fontRef>
-          </p:style>
-          <p:txBody>
-            <a:bodyPr rtlCol="0" anchor="ctr"/>
-            <a:lstStyle/>
-            <a:p>
-              <a:pPr algn="ctr"/>
-              <a:r>
-                <a:rPr lang="en-US" altLang="ko-KR" sz="900" dirty="0" err="1"/>
-                <a:t>sdo</a:t>
-              </a:r>
-              <a:endParaRPr lang="ko-KR" altLang="en-US" sz="900" dirty="0"/>
-            </a:p>
-          </p:txBody>
-        </p:sp>
-        <p:sp>
-          <p:nvSpPr>
             <p:cNvPr id="58" name="직사각형 57">
               <a:extLst>
                 <a:ext uri="{FF2B5EF4-FFF2-40B4-BE49-F238E27FC236}">
@@ -38124,56 +38024,6 @@
         </p:sp>
         <p:sp>
           <p:nvSpPr>
-            <p:cNvPr id="56" name="직사각형 55">
-              <a:extLst>
-                <a:ext uri="{FF2B5EF4-FFF2-40B4-BE49-F238E27FC236}">
-                  <a16:creationId xmlns:a16="http://schemas.microsoft.com/office/drawing/2014/main" id="{D4C0E58E-6C05-48B0-8491-B1D66D953E62}"/>
-                </a:ext>
-              </a:extLst>
-            </p:cNvPr>
-            <p:cNvSpPr/>
-            <p:nvPr/>
-          </p:nvSpPr>
-          <p:spPr>
-            <a:xfrm>
-              <a:off x="211613" y="5991826"/>
-              <a:ext cx="607602" cy="230512"/>
-            </a:xfrm>
-            <a:prstGeom prst="rect">
-              <a:avLst/>
-            </a:prstGeom>
-          </p:spPr>
-          <p:style>
-            <a:lnRef idx="2">
-              <a:schemeClr val="accent1">
-                <a:shade val="50000"/>
-              </a:schemeClr>
-            </a:lnRef>
-            <a:fillRef idx="1">
-              <a:schemeClr val="accent1"/>
-            </a:fillRef>
-            <a:effectRef idx="0">
-              <a:schemeClr val="accent1"/>
-            </a:effectRef>
-            <a:fontRef idx="minor">
-              <a:schemeClr val="lt1"/>
-            </a:fontRef>
-          </p:style>
-          <p:txBody>
-            <a:bodyPr rtlCol="0" anchor="ctr"/>
-            <a:lstStyle/>
-            <a:p>
-              <a:pPr algn="ctr"/>
-              <a:r>
-                <a:rPr lang="en-US" altLang="ko-KR" sz="900" dirty="0" err="1"/>
-                <a:t>sdo</a:t>
-              </a:r>
-              <a:endParaRPr lang="ko-KR" altLang="en-US" sz="900" dirty="0"/>
-            </a:p>
-          </p:txBody>
-        </p:sp>
-        <p:sp>
-          <p:nvSpPr>
             <p:cNvPr id="58" name="직사각형 57">
               <a:extLst>
                 <a:ext uri="{FF2B5EF4-FFF2-40B4-BE49-F238E27FC236}">

</xml_diff>